<commit_message>
Adding Good unit test slide
</commit_message>
<xml_diff>
--- a/Refactoring to Good Design using Unit Tests.pptx
+++ b/Refactoring to Good Design using Unit Tests.pptx
@@ -6,7 +6,7 @@
     <p:sldMasterId id="2147483736" r:id="rId2"/>
   </p:sldMasterIdLst>
   <p:notesMasterIdLst>
-    <p:notesMasterId r:id="rId9"/>
+    <p:notesMasterId r:id="rId10"/>
   </p:notesMasterIdLst>
   <p:sldIdLst>
     <p:sldId id="256" r:id="rId3"/>
@@ -14,7 +14,8 @@
     <p:sldId id="263" r:id="rId5"/>
     <p:sldId id="264" r:id="rId6"/>
     <p:sldId id="259" r:id="rId7"/>
-    <p:sldId id="261" r:id="rId8"/>
+    <p:sldId id="265" r:id="rId8"/>
+    <p:sldId id="261" r:id="rId9"/>
   </p:sldIdLst>
   <p:sldSz cx="12192000" cy="6858000"/>
   <p:notesSz cx="6858000" cy="9144000"/>
@@ -203,7 +204,7 @@
           <a:p>
             <a:fld id="{F63C49BD-8535-458B-AB49-9E99CAAE0E72}" type="datetimeFigureOut">
               <a:rPr lang="en-US" smtClean="0"/>
-              <a:t>7/8/2019</a:t>
+              <a:t>7/31/2019</a:t>
             </a:fld>
             <a:endParaRPr lang="en-US"/>
           </a:p>
@@ -1359,7 +1360,7 @@
           <a:p>
             <a:fld id="{4A22CF50-7503-4198-8A8C-ABFCC4CEA498}" type="datetimeFigureOut">
               <a:rPr lang="en-US" smtClean="0"/>
-              <a:t>7/8/2019</a:t>
+              <a:t>7/31/2019</a:t>
             </a:fld>
             <a:endParaRPr lang="en-US"/>
           </a:p>
@@ -1610,7 +1611,7 @@
           <a:p>
             <a:fld id="{4A22CF50-7503-4198-8A8C-ABFCC4CEA498}" type="datetimeFigureOut">
               <a:rPr lang="en-US" smtClean="0"/>
-              <a:t>7/8/2019</a:t>
+              <a:t>7/31/2019</a:t>
             </a:fld>
             <a:endParaRPr lang="en-US"/>
           </a:p>
@@ -1924,7 +1925,7 @@
           <a:p>
             <a:fld id="{4A22CF50-7503-4198-8A8C-ABFCC4CEA498}" type="datetimeFigureOut">
               <a:rPr lang="en-US" smtClean="0"/>
-              <a:t>7/8/2019</a:t>
+              <a:t>7/31/2019</a:t>
             </a:fld>
             <a:endParaRPr lang="en-US"/>
           </a:p>
@@ -2257,7 +2258,7 @@
           <a:p>
             <a:fld id="{4A22CF50-7503-4198-8A8C-ABFCC4CEA498}" type="datetimeFigureOut">
               <a:rPr lang="en-US" smtClean="0"/>
-              <a:t>7/8/2019</a:t>
+              <a:t>7/31/2019</a:t>
             </a:fld>
             <a:endParaRPr lang="en-US"/>
           </a:p>
@@ -2571,7 +2572,7 @@
           <a:p>
             <a:fld id="{4A22CF50-7503-4198-8A8C-ABFCC4CEA498}" type="datetimeFigureOut">
               <a:rPr lang="en-US" smtClean="0"/>
-              <a:t>7/8/2019</a:t>
+              <a:t>7/31/2019</a:t>
             </a:fld>
             <a:endParaRPr lang="en-US"/>
           </a:p>
@@ -2964,7 +2965,7 @@
           <a:p>
             <a:fld id="{4A22CF50-7503-4198-8A8C-ABFCC4CEA498}" type="datetimeFigureOut">
               <a:rPr lang="en-US" smtClean="0"/>
-              <a:t>7/8/2019</a:t>
+              <a:t>7/31/2019</a:t>
             </a:fld>
             <a:endParaRPr lang="en-US"/>
           </a:p>
@@ -3134,7 +3135,7 @@
           <a:p>
             <a:fld id="{4A22CF50-7503-4198-8A8C-ABFCC4CEA498}" type="datetimeFigureOut">
               <a:rPr lang="en-US" smtClean="0"/>
-              <a:t>7/8/2019</a:t>
+              <a:t>7/31/2019</a:t>
             </a:fld>
             <a:endParaRPr lang="en-US"/>
           </a:p>
@@ -3314,7 +3315,7 @@
           <a:p>
             <a:fld id="{4A22CF50-7503-4198-8A8C-ABFCC4CEA498}" type="datetimeFigureOut">
               <a:rPr lang="en-US" smtClean="0"/>
-              <a:t>7/8/2019</a:t>
+              <a:t>7/31/2019</a:t>
             </a:fld>
             <a:endParaRPr lang="en-US"/>
           </a:p>
@@ -3937,7 +3938,7 @@
           <a:p>
             <a:fld id="{E277F4CE-098B-AC47-9403-6702D754860E}" type="datetimeFigureOut">
               <a:rPr lang="en-US" smtClean="0"/>
-              <a:t>7/8/2019</a:t>
+              <a:t>7/31/2019</a:t>
             </a:fld>
             <a:endParaRPr lang="en-US"/>
           </a:p>
@@ -4381,7 +4382,7 @@
           <a:p>
             <a:fld id="{4A22CF50-7503-4198-8A8C-ABFCC4CEA498}" type="datetimeFigureOut">
               <a:rPr lang="en-US" smtClean="0"/>
-              <a:t>7/8/2019</a:t>
+              <a:t>7/31/2019</a:t>
             </a:fld>
             <a:endParaRPr lang="en-US"/>
           </a:p>
@@ -5075,7 +5076,7 @@
           <a:p>
             <a:fld id="{E277F4CE-098B-AC47-9403-6702D754860E}" type="datetimeFigureOut">
               <a:rPr lang="en-US" smtClean="0"/>
-              <a:t>7/8/2019</a:t>
+              <a:t>7/31/2019</a:t>
             </a:fld>
             <a:endParaRPr lang="en-US"/>
           </a:p>
@@ -5733,7 +5734,7 @@
           <a:p>
             <a:fld id="{E277F4CE-098B-AC47-9403-6702D754860E}" type="datetimeFigureOut">
               <a:rPr lang="en-US" smtClean="0"/>
-              <a:t>7/8/2019</a:t>
+              <a:t>7/31/2019</a:t>
             </a:fld>
             <a:endParaRPr lang="en-US"/>
           </a:p>
@@ -6045,7 +6046,7 @@
           <a:p>
             <a:fld id="{E277F4CE-098B-AC47-9403-6702D754860E}" type="datetimeFigureOut">
               <a:rPr lang="en-US" smtClean="0"/>
-              <a:t>7/8/2019</a:t>
+              <a:t>7/31/2019</a:t>
             </a:fld>
             <a:endParaRPr lang="en-US"/>
           </a:p>
@@ -9410,7 +9411,7 @@
           <a:p>
             <a:fld id="{E277F4CE-098B-AC47-9403-6702D754860E}" type="datetimeFigureOut">
               <a:rPr lang="en-US" smtClean="0"/>
-              <a:t>7/8/2019</a:t>
+              <a:t>7/31/2019</a:t>
             </a:fld>
             <a:endParaRPr lang="en-US"/>
           </a:p>
@@ -9778,7 +9779,7 @@
           <a:p>
             <a:fld id="{E277F4CE-098B-AC47-9403-6702D754860E}" type="datetimeFigureOut">
               <a:rPr lang="en-US" smtClean="0"/>
-              <a:t>7/8/2019</a:t>
+              <a:t>7/31/2019</a:t>
             </a:fld>
             <a:endParaRPr lang="en-US"/>
           </a:p>
@@ -10261,7 +10262,7 @@
           <a:p>
             <a:fld id="{4A22CF50-7503-4198-8A8C-ABFCC4CEA498}" type="datetimeFigureOut">
               <a:rPr lang="en-US" smtClean="0"/>
-              <a:t>7/8/2019</a:t>
+              <a:t>7/31/2019</a:t>
             </a:fld>
             <a:endParaRPr lang="en-US"/>
           </a:p>
@@ -10493,7 +10494,7 @@
           <a:p>
             <a:fld id="{4A22CF50-7503-4198-8A8C-ABFCC4CEA498}" type="datetimeFigureOut">
               <a:rPr lang="en-US" smtClean="0"/>
-              <a:t>7/8/2019</a:t>
+              <a:t>7/31/2019</a:t>
             </a:fld>
             <a:endParaRPr lang="en-US"/>
           </a:p>
@@ -10867,7 +10868,7 @@
           <a:p>
             <a:fld id="{4A22CF50-7503-4198-8A8C-ABFCC4CEA498}" type="datetimeFigureOut">
               <a:rPr lang="en-US" smtClean="0"/>
-              <a:t>7/8/2019</a:t>
+              <a:t>7/31/2019</a:t>
             </a:fld>
             <a:endParaRPr lang="en-US"/>
           </a:p>
@@ -10990,7 +10991,7 @@
           <a:p>
             <a:fld id="{4A22CF50-7503-4198-8A8C-ABFCC4CEA498}" type="datetimeFigureOut">
               <a:rPr lang="en-US" smtClean="0"/>
-              <a:t>7/8/2019</a:t>
+              <a:t>7/31/2019</a:t>
             </a:fld>
             <a:endParaRPr lang="en-US"/>
           </a:p>
@@ -11085,7 +11086,7 @@
           <a:p>
             <a:fld id="{4A22CF50-7503-4198-8A8C-ABFCC4CEA498}" type="datetimeFigureOut">
               <a:rPr lang="en-US" smtClean="0"/>
-              <a:t>7/8/2019</a:t>
+              <a:t>7/31/2019</a:t>
             </a:fld>
             <a:endParaRPr lang="en-US"/>
           </a:p>
@@ -11340,7 +11341,7 @@
           <a:p>
             <a:fld id="{4A22CF50-7503-4198-8A8C-ABFCC4CEA498}" type="datetimeFigureOut">
               <a:rPr lang="en-US" smtClean="0"/>
-              <a:t>7/8/2019</a:t>
+              <a:t>7/31/2019</a:t>
             </a:fld>
             <a:endParaRPr lang="en-US"/>
           </a:p>
@@ -11645,7 +11646,7 @@
           <a:p>
             <a:fld id="{4A22CF50-7503-4198-8A8C-ABFCC4CEA498}" type="datetimeFigureOut">
               <a:rPr lang="en-US" smtClean="0"/>
-              <a:t>7/8/2019</a:t>
+              <a:t>7/31/2019</a:t>
             </a:fld>
             <a:endParaRPr lang="en-US"/>
           </a:p>
@@ -12347,7 +12348,7 @@
           <a:p>
             <a:fld id="{4A22CF50-7503-4198-8A8C-ABFCC4CEA498}" type="datetimeFigureOut">
               <a:rPr lang="en-US" smtClean="0"/>
-              <a:t>7/8/2019</a:t>
+              <a:t>7/31/2019</a:t>
             </a:fld>
             <a:endParaRPr lang="en-US"/>
           </a:p>
@@ -13037,7 +13038,7 @@
           <a:p>
             <a:fld id="{E277F4CE-098B-AC47-9403-6702D754860E}" type="datetimeFigureOut">
               <a:rPr lang="en-US" smtClean="0"/>
-              <a:t>7/8/2019</a:t>
+              <a:t>7/31/2019</a:t>
             </a:fld>
             <a:endParaRPr lang="en-US"/>
           </a:p>
@@ -18478,6 +18479,95 @@
 </file>
 
 <file path=ppt/slides/slide6.xml><?xml version="1.0" encoding="utf-8"?>
+<p:sld xmlns:a="http://schemas.openxmlformats.org/drawingml/2006/main" xmlns:r="http://schemas.openxmlformats.org/officeDocument/2006/relationships" xmlns:p="http://schemas.openxmlformats.org/presentationml/2006/main">
+  <p:cSld>
+    <p:spTree>
+      <p:nvGrpSpPr>
+        <p:cNvPr id="1" name=""/>
+        <p:cNvGrpSpPr/>
+        <p:nvPr/>
+      </p:nvGrpSpPr>
+      <p:grpSpPr>
+        <a:xfrm>
+          <a:off x="0" y="0"/>
+          <a:ext cx="0" cy="0"/>
+          <a:chOff x="0" y="0"/>
+          <a:chExt cx="0" cy="0"/>
+        </a:xfrm>
+      </p:grpSpPr>
+      <p:sp>
+        <p:nvSpPr>
+          <p:cNvPr id="2" name="Title 1">
+            <a:extLst>
+              <a:ext uri="{FF2B5EF4-FFF2-40B4-BE49-F238E27FC236}">
+                <a16:creationId xmlns:a16="http://schemas.microsoft.com/office/drawing/2014/main" id="{D716FEAB-63E4-4390-8A8A-24A2DA948A67}"/>
+              </a:ext>
+            </a:extLst>
+          </p:cNvPr>
+          <p:cNvSpPr>
+            <a:spLocks noGrp="1"/>
+          </p:cNvSpPr>
+          <p:nvPr>
+            <p:ph type="title"/>
+          </p:nvPr>
+        </p:nvSpPr>
+        <p:spPr/>
+        <p:txBody>
+          <a:bodyPr/>
+          <a:lstStyle/>
+          <a:p>
+            <a:r>
+              <a:rPr lang="en-US" dirty="0"/>
+              <a:t>Good Unit Tests</a:t>
+            </a:r>
+          </a:p>
+        </p:txBody>
+      </p:sp>
+      <p:sp>
+        <p:nvSpPr>
+          <p:cNvPr id="3" name="Content Placeholder 2">
+            <a:extLst>
+              <a:ext uri="{FF2B5EF4-FFF2-40B4-BE49-F238E27FC236}">
+                <a16:creationId xmlns:a16="http://schemas.microsoft.com/office/drawing/2014/main" id="{8A014355-1D68-430C-90A2-F9595E5D332F}"/>
+              </a:ext>
+            </a:extLst>
+          </p:cNvPr>
+          <p:cNvSpPr>
+            <a:spLocks noGrp="1"/>
+          </p:cNvSpPr>
+          <p:nvPr>
+            <p:ph idx="1"/>
+          </p:nvPr>
+        </p:nvSpPr>
+        <p:spPr/>
+        <p:txBody>
+          <a:bodyPr/>
+          <a:lstStyle/>
+          <a:p>
+            <a:r>
+              <a:rPr lang="en-US"/>
+              <a:t>Atomic</a:t>
+            </a:r>
+          </a:p>
+          <a:p>
+            <a:endParaRPr lang="en-US"/>
+          </a:p>
+        </p:txBody>
+      </p:sp>
+    </p:spTree>
+    <p:extLst>
+      <p:ext uri="{BB962C8B-B14F-4D97-AF65-F5344CB8AC3E}">
+        <p14:creationId xmlns:p14="http://schemas.microsoft.com/office/powerpoint/2010/main" val="1690895207"/>
+      </p:ext>
+    </p:extLst>
+  </p:cSld>
+  <p:clrMapOvr>
+    <a:masterClrMapping/>
+  </p:clrMapOvr>
+</p:sld>
+</file>
+
+<file path=ppt/slides/slide7.xml><?xml version="1.0" encoding="utf-8"?>
 <p:sld xmlns:a="http://schemas.openxmlformats.org/drawingml/2006/main" xmlns:r="http://schemas.openxmlformats.org/officeDocument/2006/relationships" xmlns:p="http://schemas.openxmlformats.org/presentationml/2006/main">
   <p:cSld>
     <p:spTree>

</xml_diff>

<commit_message>
Added few points to the good unit test slide
</commit_message>
<xml_diff>
--- a/Refactoring to Good Design using Unit Tests.pptx
+++ b/Refactoring to Good Design using Unit Tests.pptx
@@ -18545,12 +18545,49 @@
           <a:lstStyle/>
           <a:p>
             <a:r>
-              <a:rPr lang="en-US"/>
+              <a:rPr lang="en-US" dirty="0"/>
               <a:t>Atomic</a:t>
             </a:r>
           </a:p>
           <a:p>
-            <a:endParaRPr lang="en-US"/>
+            <a:r>
+              <a:rPr lang="en-US" dirty="0"/>
+              <a:t>Try to have 1 unit test per method (since it should do only one thing)</a:t>
+            </a:r>
+          </a:p>
+          <a:p>
+            <a:pPr lvl="1"/>
+            <a:r>
+              <a:rPr lang="en-US" dirty="0"/>
+              <a:t>Not possible but have as few unit tests as possible</a:t>
+            </a:r>
+          </a:p>
+          <a:p>
+            <a:pPr lvl="1"/>
+            <a:r>
+              <a:rPr lang="en-US" dirty="0"/>
+              <a:t>Abstract out the extra thing that method is doing.</a:t>
+            </a:r>
+          </a:p>
+          <a:p>
+            <a:r>
+              <a:rPr lang="en-US" dirty="0"/>
+              <a:t>Use mocking tools like </a:t>
+            </a:r>
+            <a:r>
+              <a:rPr lang="en-US" dirty="0" err="1"/>
+              <a:t>Nsubstitute</a:t>
+            </a:r>
+            <a:r>
+              <a:rPr lang="en-US" dirty="0"/>
+              <a:t> to mock the desired results external Interfaces.</a:t>
+            </a:r>
+          </a:p>
+          <a:p>
+            <a:endParaRPr lang="en-US" dirty="0"/>
+          </a:p>
+          <a:p>
+            <a:endParaRPr lang="en-US" dirty="0"/>
           </a:p>
         </p:txBody>
       </p:sp>

</xml_diff>